<commit_message>
#0 update delivery 3 document
</commit_message>
<xml_diff>
--- a/report_project/Delivery3/Report Graph.pptx
+++ b/report_project/Delivery3/Report Graph.pptx
@@ -4,9 +4,13 @@
   <p:sldMasterIdLst>
     <p:sldMasterId id="2147483648" r:id="rId1"/>
   </p:sldMasterIdLst>
+  <p:notesMasterIdLst>
+    <p:notesMasterId r:id="rId6"/>
+  </p:notesMasterIdLst>
   <p:sldIdLst>
     <p:sldId id="256" r:id="rId3"/>
     <p:sldId id="257" r:id="rId4"/>
+    <p:sldId id="258" r:id="rId5"/>
   </p:sldIdLst>
   <p:sldSz cx="12192000" cy="6858000"/>
   <p:notesSz cx="6858000" cy="9144000"/>
@@ -121,6 +125,397 @@
     <p:text/>
   </p:cm>
 </p:cmLst>
+</file>
+
+<file path=ppt/notesMasters/notesMaster1.xml><?xml version="1.0" encoding="utf-8"?>
+<p:notesMaster xmlns:a="http://schemas.openxmlformats.org/drawingml/2006/main" xmlns:r="http://schemas.openxmlformats.org/officeDocument/2006/relationships" xmlns:p="http://schemas.openxmlformats.org/presentationml/2006/main">
+  <p:cSld>
+    <p:bg>
+      <p:bgRef idx="1001">
+        <a:schemeClr val="bg1"/>
+      </p:bgRef>
+    </p:bg>
+    <p:spTree>
+      <p:nvGrpSpPr>
+        <p:cNvPr id="1" name=""/>
+        <p:cNvGrpSpPr/>
+        <p:nvPr/>
+      </p:nvGrpSpPr>
+      <p:grpSpPr>
+        <a:xfrm>
+          <a:off x="0" y="0"/>
+          <a:ext cx="0" cy="0"/>
+          <a:chOff x="0" y="0"/>
+          <a:chExt cx="0" cy="0"/>
+        </a:xfrm>
+      </p:grpSpPr>
+      <p:sp>
+        <p:nvSpPr>
+          <p:cNvPr id="2" name="Header Placeholder 1"/>
+          <p:cNvSpPr>
+            <a:spLocks noGrp="1"/>
+          </p:cNvSpPr>
+          <p:nvPr>
+            <p:ph type="hdr" sz="quarter"/>
+          </p:nvPr>
+        </p:nvSpPr>
+        <p:spPr>
+          <a:xfrm>
+            <a:off x="0" y="0"/>
+            <a:ext cx="2971800" cy="458788"/>
+          </a:xfrm>
+          <a:prstGeom prst="rect">
+            <a:avLst/>
+          </a:prstGeom>
+        </p:spPr>
+        <p:txBody>
+          <a:bodyPr vert="horz" lIns="91440" tIns="45720" rIns="91440" bIns="45720" rtlCol="0"/>
+          <a:lstStyle>
+            <a:lvl1pPr algn="l">
+              <a:defRPr sz="1200"/>
+            </a:lvl1pPr>
+          </a:lstStyle>
+          <a:p>
+            <a:endParaRPr lang="en-US"/>
+          </a:p>
+        </p:txBody>
+      </p:sp>
+      <p:sp>
+        <p:nvSpPr>
+          <p:cNvPr id="3" name="Date Placeholder 2"/>
+          <p:cNvSpPr>
+            <a:spLocks noGrp="1"/>
+          </p:cNvSpPr>
+          <p:nvPr>
+            <p:ph type="dt" idx="1"/>
+          </p:nvPr>
+        </p:nvSpPr>
+        <p:spPr>
+          <a:xfrm>
+            <a:off x="3884613" y="0"/>
+            <a:ext cx="2971800" cy="458788"/>
+          </a:xfrm>
+          <a:prstGeom prst="rect">
+            <a:avLst/>
+          </a:prstGeom>
+        </p:spPr>
+        <p:txBody>
+          <a:bodyPr vert="horz" lIns="91440" tIns="45720" rIns="91440" bIns="45720" rtlCol="0"/>
+          <a:lstStyle>
+            <a:lvl1pPr algn="r">
+              <a:defRPr sz="1200"/>
+            </a:lvl1pPr>
+          </a:lstStyle>
+          <a:p>
+            <a:fld id="{3EFD42F7-718C-4B98-AAEC-167E6DDD60A7}" type="datetimeFigureOut">
+              <a:rPr lang="en-US" smtClean="0"/>
+            </a:fld>
+            <a:endParaRPr lang="en-US"/>
+          </a:p>
+        </p:txBody>
+      </p:sp>
+      <p:sp>
+        <p:nvSpPr>
+          <p:cNvPr id="4" name="Slide Image Placeholder 3"/>
+          <p:cNvSpPr>
+            <a:spLocks noGrp="1" noRot="1" noChangeAspect="1"/>
+          </p:cNvSpPr>
+          <p:nvPr>
+            <p:ph type="sldImg" idx="2"/>
+          </p:nvPr>
+        </p:nvSpPr>
+        <p:spPr>
+          <a:xfrm>
+            <a:off x="685800" y="1143000"/>
+            <a:ext cx="5486400" cy="3086100"/>
+          </a:xfrm>
+          <a:prstGeom prst="rect">
+            <a:avLst/>
+          </a:prstGeom>
+          <a:noFill/>
+          <a:ln w="12700">
+            <a:solidFill>
+              <a:prstClr val="black"/>
+            </a:solidFill>
+          </a:ln>
+        </p:spPr>
+        <p:txBody>
+          <a:bodyPr vert="horz" lIns="91440" tIns="45720" rIns="91440" bIns="45720" rtlCol="0" anchor="ctr"/>
+          <a:lstStyle/>
+          <a:p>
+            <a:endParaRPr lang="en-US"/>
+          </a:p>
+        </p:txBody>
+      </p:sp>
+      <p:sp>
+        <p:nvSpPr>
+          <p:cNvPr id="5" name="Notes Placeholder 4"/>
+          <p:cNvSpPr>
+            <a:spLocks noGrp="1"/>
+          </p:cNvSpPr>
+          <p:nvPr>
+            <p:ph type="body" sz="quarter" idx="3"/>
+          </p:nvPr>
+        </p:nvSpPr>
+        <p:spPr>
+          <a:xfrm>
+            <a:off x="685800" y="4400550"/>
+            <a:ext cx="5486400" cy="3600450"/>
+          </a:xfrm>
+          <a:prstGeom prst="rect">
+            <a:avLst/>
+          </a:prstGeom>
+        </p:spPr>
+        <p:txBody>
+          <a:bodyPr vert="horz" lIns="91440" tIns="45720" rIns="91440" bIns="45720" rtlCol="0"/>
+          <a:lstStyle/>
+          <a:p>
+            <a:pPr lvl="0"/>
+            <a:r>
+              <a:rPr lang="en-US" smtClean="0"/>
+              <a:t>Click to edit Master text styles</a:t>
+            </a:r>
+            <a:endParaRPr lang="en-US" smtClean="0"/>
+          </a:p>
+          <a:p>
+            <a:pPr lvl="1"/>
+            <a:r>
+              <a:rPr lang="en-US" smtClean="0"/>
+              <a:t>Second level</a:t>
+            </a:r>
+            <a:endParaRPr lang="en-US" smtClean="0"/>
+          </a:p>
+          <a:p>
+            <a:pPr lvl="2"/>
+            <a:r>
+              <a:rPr lang="en-US" smtClean="0"/>
+              <a:t>Third level</a:t>
+            </a:r>
+            <a:endParaRPr lang="en-US" smtClean="0"/>
+          </a:p>
+          <a:p>
+            <a:pPr lvl="3"/>
+            <a:r>
+              <a:rPr lang="en-US" smtClean="0"/>
+              <a:t>Fourth level</a:t>
+            </a:r>
+            <a:endParaRPr lang="en-US" smtClean="0"/>
+          </a:p>
+          <a:p>
+            <a:pPr lvl="4"/>
+            <a:r>
+              <a:rPr lang="en-US" smtClean="0"/>
+              <a:t>Fifth level</a:t>
+            </a:r>
+            <a:endParaRPr lang="en-US"/>
+          </a:p>
+        </p:txBody>
+      </p:sp>
+      <p:sp>
+        <p:nvSpPr>
+          <p:cNvPr id="6" name="Footer Placeholder 5"/>
+          <p:cNvSpPr>
+            <a:spLocks noGrp="1"/>
+          </p:cNvSpPr>
+          <p:nvPr>
+            <p:ph type="ftr" sz="quarter" idx="4"/>
+          </p:nvPr>
+        </p:nvSpPr>
+        <p:spPr>
+          <a:xfrm>
+            <a:off x="0" y="8685213"/>
+            <a:ext cx="2971800" cy="458787"/>
+          </a:xfrm>
+          <a:prstGeom prst="rect">
+            <a:avLst/>
+          </a:prstGeom>
+        </p:spPr>
+        <p:txBody>
+          <a:bodyPr vert="horz" lIns="91440" tIns="45720" rIns="91440" bIns="45720" rtlCol="0" anchor="b"/>
+          <a:lstStyle>
+            <a:lvl1pPr algn="l">
+              <a:defRPr sz="1200"/>
+            </a:lvl1pPr>
+          </a:lstStyle>
+          <a:p>
+            <a:endParaRPr lang="en-US"/>
+          </a:p>
+        </p:txBody>
+      </p:sp>
+      <p:sp>
+        <p:nvSpPr>
+          <p:cNvPr id="7" name="Slide Number Placeholder 6"/>
+          <p:cNvSpPr>
+            <a:spLocks noGrp="1"/>
+          </p:cNvSpPr>
+          <p:nvPr>
+            <p:ph type="sldNum" sz="quarter" idx="5"/>
+          </p:nvPr>
+        </p:nvSpPr>
+        <p:spPr>
+          <a:xfrm>
+            <a:off x="3884613" y="8685213"/>
+            <a:ext cx="2971800" cy="458787"/>
+          </a:xfrm>
+          <a:prstGeom prst="rect">
+            <a:avLst/>
+          </a:prstGeom>
+        </p:spPr>
+        <p:txBody>
+          <a:bodyPr vert="horz" lIns="91440" tIns="45720" rIns="91440" bIns="45720" rtlCol="0" anchor="b"/>
+          <a:lstStyle>
+            <a:lvl1pPr algn="r">
+              <a:defRPr sz="1200"/>
+            </a:lvl1pPr>
+          </a:lstStyle>
+          <a:p>
+            <a:fld id="{21B2AA4F-B828-4D7C-AFD3-893933DAFCB4}" type="slidenum">
+              <a:rPr lang="en-US" smtClean="0"/>
+            </a:fld>
+            <a:endParaRPr lang="en-US"/>
+          </a:p>
+        </p:txBody>
+      </p:sp>
+    </p:spTree>
+  </p:cSld>
+  <p:clrMap bg1="lt1" tx1="dk1" bg2="lt2" tx2="dk2" accent1="accent1" accent2="accent2" accent3="accent3" accent4="accent4" accent5="accent5" accent6="accent6" hlink="hlink" folHlink="folHlink"/>
+  <p:notesStyle>
+    <a:lvl1pPr marL="0" algn="l" defTabSz="914400" rtl="0" eaLnBrk="1" latinLnBrk="0" hangingPunct="1">
+      <a:defRPr sz="1200" kern="1200">
+        <a:solidFill>
+          <a:schemeClr val="tx1"/>
+        </a:solidFill>
+        <a:latin typeface="+mn-lt"/>
+        <a:ea typeface="+mn-ea"/>
+        <a:cs typeface="+mn-cs"/>
+      </a:defRPr>
+    </a:lvl1pPr>
+    <a:lvl2pPr marL="457200" algn="l" defTabSz="914400" rtl="0" eaLnBrk="1" latinLnBrk="0" hangingPunct="1">
+      <a:defRPr sz="1200" kern="1200">
+        <a:solidFill>
+          <a:schemeClr val="tx1"/>
+        </a:solidFill>
+        <a:latin typeface="+mn-lt"/>
+        <a:ea typeface="+mn-ea"/>
+        <a:cs typeface="+mn-cs"/>
+      </a:defRPr>
+    </a:lvl2pPr>
+    <a:lvl3pPr marL="914400" algn="l" defTabSz="914400" rtl="0" eaLnBrk="1" latinLnBrk="0" hangingPunct="1">
+      <a:defRPr sz="1200" kern="1200">
+        <a:solidFill>
+          <a:schemeClr val="tx1"/>
+        </a:solidFill>
+        <a:latin typeface="+mn-lt"/>
+        <a:ea typeface="+mn-ea"/>
+        <a:cs typeface="+mn-cs"/>
+      </a:defRPr>
+    </a:lvl3pPr>
+    <a:lvl4pPr marL="1371600" algn="l" defTabSz="914400" rtl="0" eaLnBrk="1" latinLnBrk="0" hangingPunct="1">
+      <a:defRPr sz="1200" kern="1200">
+        <a:solidFill>
+          <a:schemeClr val="tx1"/>
+        </a:solidFill>
+        <a:latin typeface="+mn-lt"/>
+        <a:ea typeface="+mn-ea"/>
+        <a:cs typeface="+mn-cs"/>
+      </a:defRPr>
+    </a:lvl4pPr>
+    <a:lvl5pPr marL="1828800" algn="l" defTabSz="914400" rtl="0" eaLnBrk="1" latinLnBrk="0" hangingPunct="1">
+      <a:defRPr sz="1200" kern="1200">
+        <a:solidFill>
+          <a:schemeClr val="tx1"/>
+        </a:solidFill>
+        <a:latin typeface="+mn-lt"/>
+        <a:ea typeface="+mn-ea"/>
+        <a:cs typeface="+mn-cs"/>
+      </a:defRPr>
+    </a:lvl5pPr>
+    <a:lvl6pPr marL="2286000" algn="l" defTabSz="914400" rtl="0" eaLnBrk="1" latinLnBrk="0" hangingPunct="1">
+      <a:defRPr sz="1200" kern="1200">
+        <a:solidFill>
+          <a:schemeClr val="tx1"/>
+        </a:solidFill>
+        <a:latin typeface="+mn-lt"/>
+        <a:ea typeface="+mn-ea"/>
+        <a:cs typeface="+mn-cs"/>
+      </a:defRPr>
+    </a:lvl6pPr>
+    <a:lvl7pPr marL="2743200" algn="l" defTabSz="914400" rtl="0" eaLnBrk="1" latinLnBrk="0" hangingPunct="1">
+      <a:defRPr sz="1200" kern="1200">
+        <a:solidFill>
+          <a:schemeClr val="tx1"/>
+        </a:solidFill>
+        <a:latin typeface="+mn-lt"/>
+        <a:ea typeface="+mn-ea"/>
+        <a:cs typeface="+mn-cs"/>
+      </a:defRPr>
+    </a:lvl7pPr>
+    <a:lvl8pPr marL="3200400" algn="l" defTabSz="914400" rtl="0" eaLnBrk="1" latinLnBrk="0" hangingPunct="1">
+      <a:defRPr sz="1200" kern="1200">
+        <a:solidFill>
+          <a:schemeClr val="tx1"/>
+        </a:solidFill>
+        <a:latin typeface="+mn-lt"/>
+        <a:ea typeface="+mn-ea"/>
+        <a:cs typeface="+mn-cs"/>
+      </a:defRPr>
+    </a:lvl8pPr>
+    <a:lvl9pPr marL="3657600" algn="l" defTabSz="914400" rtl="0" eaLnBrk="1" latinLnBrk="0" hangingPunct="1">
+      <a:defRPr sz="1200" kern="1200">
+        <a:solidFill>
+          <a:schemeClr val="tx1"/>
+        </a:solidFill>
+        <a:latin typeface="+mn-lt"/>
+        <a:ea typeface="+mn-ea"/>
+        <a:cs typeface="+mn-cs"/>
+      </a:defRPr>
+    </a:lvl9pPr>
+  </p:notesStyle>
+</p:notesMaster>
+</file>
+
+<file path=ppt/notesSlides/notesSlide1.xml><?xml version="1.0" encoding="utf-8"?>
+<p:notes xmlns:a="http://schemas.openxmlformats.org/drawingml/2006/main" xmlns:r="http://schemas.openxmlformats.org/officeDocument/2006/relationships" xmlns:p="http://schemas.openxmlformats.org/presentationml/2006/main">
+  <p:cSld>
+    <p:spTree>
+      <p:nvGrpSpPr>
+        <p:cNvPr id="1" name=""/>
+        <p:cNvGrpSpPr/>
+        <p:nvPr/>
+      </p:nvGrpSpPr>
+      <p:grpSpPr/>
+      <p:sp>
+        <p:nvSpPr>
+          <p:cNvPr id="2" name="Slide Image Placeholder 1"/>
+          <p:cNvSpPr/>
+          <p:nvPr>
+            <p:ph type="sldImg" idx="2"/>
+          </p:nvPr>
+        </p:nvSpPr>
+        <p:spPr/>
+      </p:sp>
+      <p:sp>
+        <p:nvSpPr>
+          <p:cNvPr id="3" name="Text Placeholder 2"/>
+          <p:cNvSpPr/>
+          <p:nvPr>
+            <p:ph type="body" idx="3"/>
+          </p:nvPr>
+        </p:nvSpPr>
+        <p:spPr/>
+        <p:txBody>
+          <a:bodyPr/>
+          <a:p>
+            <a:endParaRPr lang="en-US"/>
+          </a:p>
+        </p:txBody>
+      </p:sp>
+    </p:spTree>
+  </p:cSld>
+  <p:clrMapOvr>
+    <a:masterClrMapping/>
+  </p:clrMapOvr>
+</p:notes>
 </file>
 
 <file path=ppt/slideLayouts/slideLayout1.xml><?xml version="1.0" encoding="utf-8"?>
@@ -7745,6 +8140,1364 @@
 </p:sld>
 </file>
 
+<file path=ppt/slides/slide3.xml><?xml version="1.0" encoding="utf-8"?>
+<p:sld xmlns:a="http://schemas.openxmlformats.org/drawingml/2006/main" xmlns:r="http://schemas.openxmlformats.org/officeDocument/2006/relationships" xmlns:p="http://schemas.openxmlformats.org/presentationml/2006/main">
+  <p:cSld>
+    <p:spTree>
+      <p:nvGrpSpPr>
+        <p:cNvPr id="1" name=""/>
+        <p:cNvGrpSpPr/>
+        <p:nvPr/>
+      </p:nvGrpSpPr>
+      <p:grpSpPr/>
+      <p:grpSp>
+        <p:nvGrpSpPr>
+          <p:cNvPr id="71" name="Group 70"/>
+          <p:cNvGrpSpPr/>
+          <p:nvPr/>
+        </p:nvGrpSpPr>
+        <p:grpSpPr>
+          <a:xfrm>
+            <a:off x="309880" y="217170"/>
+            <a:ext cx="11623040" cy="5215890"/>
+            <a:chOff x="2056" y="1208"/>
+            <a:chExt cx="14849" cy="6935"/>
+          </a:xfrm>
+        </p:grpSpPr>
+        <p:sp>
+          <p:nvSpPr>
+            <p:cNvPr id="26" name="Rounded Rectangle 25"/>
+            <p:cNvSpPr/>
+            <p:nvPr/>
+          </p:nvSpPr>
+          <p:spPr>
+            <a:xfrm>
+              <a:off x="2056" y="1208"/>
+              <a:ext cx="6706" cy="2835"/>
+            </a:xfrm>
+            <a:prstGeom prst="roundRect">
+              <a:avLst>
+                <a:gd name="adj" fmla="val 6436"/>
+              </a:avLst>
+            </a:prstGeom>
+            <a:noFill/>
+            <a:ln w="28575" cmpd="sng">
+              <a:solidFill>
+                <a:srgbClr val="FFC000"/>
+              </a:solidFill>
+              <a:prstDash val="solid"/>
+            </a:ln>
+          </p:spPr>
+          <p:style>
+            <a:lnRef idx="2">
+              <a:schemeClr val="accent1">
+                <a:lumMod val="75000"/>
+              </a:schemeClr>
+            </a:lnRef>
+            <a:fillRef idx="1">
+              <a:schemeClr val="accent1"/>
+            </a:fillRef>
+            <a:effectRef idx="0">
+              <a:srgbClr val="FFFFFF"/>
+            </a:effectRef>
+            <a:fontRef idx="minor">
+              <a:schemeClr val="lt1"/>
+            </a:fontRef>
+          </p:style>
+          <p:txBody>
+            <a:bodyPr rtlCol="0" anchor="ctr"/>
+            <a:p>
+              <a:pPr algn="ctr"/>
+              <a:r>
+                <a:rPr lang="en-US" sz="1600" b="1">
+                  <a:solidFill>
+                    <a:schemeClr val="tx1"/>
+                  </a:solidFill>
+                </a:rPr>
+                <a:t>View</a:t>
+              </a:r>
+              <a:br>
+                <a:rPr lang="en-US" sz="1600" b="1">
+                  <a:solidFill>
+                    <a:schemeClr val="tx1"/>
+                  </a:solidFill>
+                </a:rPr>
+              </a:br>
+              <a:br>
+                <a:rPr lang="en-US" sz="1600" b="1">
+                  <a:solidFill>
+                    <a:schemeClr val="tx1"/>
+                  </a:solidFill>
+                </a:rPr>
+              </a:br>
+              <a:br>
+                <a:rPr lang="en-US" sz="1600" b="1">
+                  <a:solidFill>
+                    <a:schemeClr val="tx1"/>
+                  </a:solidFill>
+                </a:rPr>
+              </a:br>
+              <a:br>
+                <a:rPr lang="en-US" sz="1600" b="1">
+                  <a:solidFill>
+                    <a:schemeClr val="tx1"/>
+                  </a:solidFill>
+                </a:rPr>
+              </a:br>
+              <a:br>
+                <a:rPr lang="en-US" sz="1600" b="1">
+                  <a:solidFill>
+                    <a:schemeClr val="tx1"/>
+                  </a:solidFill>
+                </a:rPr>
+              </a:br>
+              <a:br>
+                <a:rPr lang="en-US" sz="1600" b="1">
+                  <a:solidFill>
+                    <a:schemeClr val="tx1"/>
+                  </a:solidFill>
+                </a:rPr>
+              </a:br>
+              <a:br>
+                <a:rPr lang="en-US" sz="1600" b="1">
+                  <a:solidFill>
+                    <a:schemeClr val="tx1"/>
+                  </a:solidFill>
+                </a:rPr>
+              </a:br>
+              <a:endParaRPr lang="en-US" sz="1600" b="1">
+                <a:solidFill>
+                  <a:schemeClr val="tx1"/>
+                </a:solidFill>
+              </a:endParaRPr>
+            </a:p>
+          </p:txBody>
+        </p:sp>
+        <p:sp>
+          <p:nvSpPr>
+            <p:cNvPr id="61" name="Rounded Rectangle 60"/>
+            <p:cNvSpPr/>
+            <p:nvPr/>
+          </p:nvSpPr>
+          <p:spPr>
+            <a:xfrm>
+              <a:off x="6226" y="5306"/>
+              <a:ext cx="6735" cy="2837"/>
+            </a:xfrm>
+            <a:prstGeom prst="roundRect">
+              <a:avLst>
+                <a:gd name="adj" fmla="val 6436"/>
+              </a:avLst>
+            </a:prstGeom>
+            <a:noFill/>
+            <a:ln w="28575" cmpd="sng">
+              <a:solidFill>
+                <a:srgbClr val="00B050"/>
+              </a:solidFill>
+              <a:prstDash val="solid"/>
+            </a:ln>
+          </p:spPr>
+          <p:style>
+            <a:lnRef idx="2">
+              <a:schemeClr val="accent1">
+                <a:lumMod val="75000"/>
+              </a:schemeClr>
+            </a:lnRef>
+            <a:fillRef idx="1">
+              <a:schemeClr val="accent1"/>
+            </a:fillRef>
+            <a:effectRef idx="0">
+              <a:srgbClr val="FFFFFF"/>
+            </a:effectRef>
+            <a:fontRef idx="minor">
+              <a:schemeClr val="lt1"/>
+            </a:fontRef>
+          </p:style>
+          <p:txBody>
+            <a:bodyPr rtlCol="0" anchor="ctr"/>
+            <a:p>
+              <a:pPr algn="ctr"/>
+              <a:r>
+                <a:rPr lang="en-US" sz="1600" b="1">
+                  <a:solidFill>
+                    <a:schemeClr val="tx1"/>
+                  </a:solidFill>
+                </a:rPr>
+                <a:t>Model</a:t>
+              </a:r>
+              <a:br>
+                <a:rPr lang="en-US" sz="1600" b="1">
+                  <a:solidFill>
+                    <a:schemeClr val="tx1"/>
+                  </a:solidFill>
+                </a:rPr>
+              </a:br>
+              <a:br>
+                <a:rPr lang="en-US" sz="1600" b="1">
+                  <a:solidFill>
+                    <a:schemeClr val="tx1"/>
+                  </a:solidFill>
+                </a:rPr>
+              </a:br>
+              <a:br>
+                <a:rPr lang="en-US" sz="1600" b="1">
+                  <a:solidFill>
+                    <a:schemeClr val="tx1"/>
+                  </a:solidFill>
+                </a:rPr>
+              </a:br>
+              <a:br>
+                <a:rPr lang="en-US" sz="1600" b="1">
+                  <a:solidFill>
+                    <a:schemeClr val="tx1"/>
+                  </a:solidFill>
+                </a:rPr>
+              </a:br>
+              <a:br>
+                <a:rPr lang="en-US" sz="1600" b="1">
+                  <a:solidFill>
+                    <a:schemeClr val="tx1"/>
+                  </a:solidFill>
+                </a:rPr>
+              </a:br>
+              <a:br>
+                <a:rPr lang="en-US" sz="1600" b="1">
+                  <a:solidFill>
+                    <a:schemeClr val="tx1"/>
+                  </a:solidFill>
+                </a:rPr>
+              </a:br>
+              <a:br>
+                <a:rPr lang="en-US" sz="1600" b="1">
+                  <a:solidFill>
+                    <a:schemeClr val="tx1"/>
+                  </a:solidFill>
+                </a:rPr>
+              </a:br>
+              <a:endParaRPr lang="en-US" sz="1600" b="1">
+                <a:solidFill>
+                  <a:schemeClr val="tx1"/>
+                </a:solidFill>
+              </a:endParaRPr>
+            </a:p>
+          </p:txBody>
+        </p:sp>
+        <p:sp>
+          <p:nvSpPr>
+            <p:cNvPr id="10" name="Rounded Rectangle 9"/>
+            <p:cNvSpPr/>
+            <p:nvPr/>
+          </p:nvSpPr>
+          <p:spPr>
+            <a:xfrm>
+              <a:off x="10170" y="1218"/>
+              <a:ext cx="6735" cy="2825"/>
+            </a:xfrm>
+            <a:prstGeom prst="roundRect">
+              <a:avLst>
+                <a:gd name="adj" fmla="val 6436"/>
+              </a:avLst>
+            </a:prstGeom>
+            <a:noFill/>
+            <a:ln w="28575" cmpd="sng">
+              <a:solidFill>
+                <a:srgbClr val="FF0000"/>
+              </a:solidFill>
+              <a:prstDash val="solid"/>
+            </a:ln>
+          </p:spPr>
+          <p:style>
+            <a:lnRef idx="2">
+              <a:schemeClr val="accent1">
+                <a:lumMod val="75000"/>
+              </a:schemeClr>
+            </a:lnRef>
+            <a:fillRef idx="1">
+              <a:schemeClr val="accent1"/>
+            </a:fillRef>
+            <a:effectRef idx="0">
+              <a:srgbClr val="FFFFFF"/>
+            </a:effectRef>
+            <a:fontRef idx="minor">
+              <a:schemeClr val="lt1"/>
+            </a:fontRef>
+          </p:style>
+          <p:txBody>
+            <a:bodyPr rtlCol="0" anchor="ctr"/>
+            <a:p>
+              <a:pPr algn="ctr"/>
+              <a:r>
+                <a:rPr lang="en-US" sz="1600" b="1">
+                  <a:solidFill>
+                    <a:schemeClr val="tx1"/>
+                  </a:solidFill>
+                  <a:sym typeface="+mn-ea"/>
+                </a:rPr>
+                <a:t>Controller</a:t>
+              </a:r>
+              <a:br>
+                <a:rPr lang="en-US" sz="1600" b="1">
+                  <a:solidFill>
+                    <a:schemeClr val="tx1"/>
+                  </a:solidFill>
+                  <a:sym typeface="+mn-ea"/>
+                </a:rPr>
+              </a:br>
+              <a:br>
+                <a:rPr lang="en-US" sz="1600" b="1">
+                  <a:solidFill>
+                    <a:schemeClr val="tx1"/>
+                  </a:solidFill>
+                  <a:sym typeface="+mn-ea"/>
+                </a:rPr>
+              </a:br>
+              <a:br>
+                <a:rPr lang="en-US" sz="1600" b="1">
+                  <a:solidFill>
+                    <a:schemeClr val="tx1"/>
+                  </a:solidFill>
+                  <a:sym typeface="+mn-ea"/>
+                </a:rPr>
+              </a:br>
+              <a:br>
+                <a:rPr lang="en-US" sz="1600" b="1">
+                  <a:solidFill>
+                    <a:schemeClr val="tx1"/>
+                  </a:solidFill>
+                  <a:sym typeface="+mn-ea"/>
+                </a:rPr>
+              </a:br>
+              <a:br>
+                <a:rPr lang="en-US" sz="1600" b="1">
+                  <a:solidFill>
+                    <a:schemeClr val="tx1"/>
+                  </a:solidFill>
+                  <a:sym typeface="+mn-ea"/>
+                </a:rPr>
+              </a:br>
+              <a:br>
+                <a:rPr lang="en-US" sz="1600" b="1">
+                  <a:solidFill>
+                    <a:schemeClr val="tx1"/>
+                  </a:solidFill>
+                  <a:sym typeface="+mn-ea"/>
+                </a:rPr>
+              </a:br>
+              <a:endParaRPr lang="en-US" sz="1600" b="1">
+                <a:solidFill>
+                  <a:schemeClr val="tx1"/>
+                </a:solidFill>
+              </a:endParaRPr>
+            </a:p>
+            <a:p>
+              <a:pPr algn="ctr"/>
+              <a:endParaRPr lang="en-US" sz="1600" b="1">
+                <a:solidFill>
+                  <a:schemeClr val="tx1"/>
+                </a:solidFill>
+              </a:endParaRPr>
+            </a:p>
+          </p:txBody>
+        </p:sp>
+        <p:sp>
+          <p:nvSpPr>
+            <p:cNvPr id="38" name="Rounded Rectangle 37"/>
+            <p:cNvSpPr/>
+            <p:nvPr/>
+          </p:nvSpPr>
+          <p:spPr>
+            <a:xfrm>
+              <a:off x="6369" y="6077"/>
+              <a:ext cx="3114" cy="751"/>
+            </a:xfrm>
+            <a:prstGeom prst="roundRect">
+              <a:avLst>
+                <a:gd name="adj" fmla="val 3056"/>
+              </a:avLst>
+            </a:prstGeom>
+            <a:noFill/>
+            <a:ln w="28575" cmpd="sng">
+              <a:solidFill>
+                <a:schemeClr val="tx1"/>
+              </a:solidFill>
+              <a:prstDash val="solid"/>
+            </a:ln>
+          </p:spPr>
+          <p:style>
+            <a:lnRef idx="2">
+              <a:schemeClr val="accent1">
+                <a:lumMod val="75000"/>
+              </a:schemeClr>
+            </a:lnRef>
+            <a:fillRef idx="1">
+              <a:schemeClr val="accent1"/>
+            </a:fillRef>
+            <a:effectRef idx="0">
+              <a:srgbClr val="FFFFFF"/>
+            </a:effectRef>
+            <a:fontRef idx="minor">
+              <a:schemeClr val="lt1"/>
+            </a:fontRef>
+          </p:style>
+          <p:txBody>
+            <a:bodyPr rtlCol="0" anchor="ctr"/>
+            <a:p>
+              <a:pPr algn="ctr"/>
+              <a:r>
+                <a:rPr lang="en-US" sz="1200">
+                  <a:solidFill>
+                    <a:schemeClr val="tx1"/>
+                  </a:solidFill>
+                </a:rPr>
+                <a:t>City Data Model</a:t>
+              </a:r>
+              <a:endParaRPr lang="en-US" sz="1200">
+                <a:solidFill>
+                  <a:schemeClr val="tx1"/>
+                </a:solidFill>
+              </a:endParaRPr>
+            </a:p>
+          </p:txBody>
+        </p:sp>
+        <p:sp>
+          <p:nvSpPr>
+            <p:cNvPr id="50" name="Up-Down Arrow 49"/>
+            <p:cNvSpPr/>
+            <p:nvPr/>
+          </p:nvSpPr>
+          <p:spPr>
+            <a:xfrm rot="16200000">
+              <a:off x="9334" y="2126"/>
+              <a:ext cx="229" cy="1390"/>
+            </a:xfrm>
+            <a:prstGeom prst="upDownArrow">
+              <a:avLst>
+                <a:gd name="adj1" fmla="val 39301"/>
+                <a:gd name="adj2" fmla="val 94104"/>
+              </a:avLst>
+            </a:prstGeom>
+            <a:solidFill>
+              <a:schemeClr val="tx1"/>
+            </a:solidFill>
+            <a:ln>
+              <a:solidFill>
+                <a:schemeClr val="tx1"/>
+              </a:solidFill>
+            </a:ln>
+          </p:spPr>
+          <p:style>
+            <a:lnRef idx="2">
+              <a:schemeClr val="accent1">
+                <a:lumMod val="75000"/>
+              </a:schemeClr>
+            </a:lnRef>
+            <a:fillRef idx="1">
+              <a:schemeClr val="accent1"/>
+            </a:fillRef>
+            <a:effectRef idx="0">
+              <a:srgbClr val="FFFFFF"/>
+            </a:effectRef>
+            <a:fontRef idx="minor">
+              <a:schemeClr val="lt1"/>
+            </a:fontRef>
+          </p:style>
+          <p:txBody>
+            <a:bodyPr rtlCol="0" anchor="ctr"/>
+            <a:p>
+              <a:pPr algn="ctr"/>
+              <a:endParaRPr lang="en-US"/>
+            </a:p>
+          </p:txBody>
+        </p:sp>
+        <p:sp>
+          <p:nvSpPr>
+            <p:cNvPr id="3" name="Rounded Rectangle 2"/>
+            <p:cNvSpPr/>
+            <p:nvPr/>
+          </p:nvSpPr>
+          <p:spPr>
+            <a:xfrm>
+              <a:off x="6369" y="7055"/>
+              <a:ext cx="3114" cy="751"/>
+            </a:xfrm>
+            <a:prstGeom prst="roundRect">
+              <a:avLst>
+                <a:gd name="adj" fmla="val 3056"/>
+              </a:avLst>
+            </a:prstGeom>
+            <a:noFill/>
+            <a:ln w="28575" cmpd="sng">
+              <a:solidFill>
+                <a:schemeClr val="tx1"/>
+              </a:solidFill>
+              <a:prstDash val="solid"/>
+            </a:ln>
+          </p:spPr>
+          <p:style>
+            <a:lnRef idx="2">
+              <a:schemeClr val="accent1">
+                <a:lumMod val="75000"/>
+              </a:schemeClr>
+            </a:lnRef>
+            <a:fillRef idx="1">
+              <a:schemeClr val="accent1"/>
+            </a:fillRef>
+            <a:effectRef idx="0">
+              <a:srgbClr val="FFFFFF"/>
+            </a:effectRef>
+            <a:fontRef idx="minor">
+              <a:schemeClr val="lt1"/>
+            </a:fontRef>
+          </p:style>
+          <p:txBody>
+            <a:bodyPr rtlCol="0" anchor="ctr"/>
+            <a:p>
+              <a:pPr algn="ctr"/>
+              <a:r>
+                <a:rPr lang="en-US" sz="1200">
+                  <a:solidFill>
+                    <a:schemeClr val="tx1"/>
+                  </a:solidFill>
+                </a:rPr>
+                <a:t>Data Analysis Model</a:t>
+              </a:r>
+              <a:endParaRPr lang="en-US" sz="1200">
+                <a:solidFill>
+                  <a:schemeClr val="tx1"/>
+                </a:solidFill>
+              </a:endParaRPr>
+            </a:p>
+          </p:txBody>
+        </p:sp>
+        <p:sp>
+          <p:nvSpPr>
+            <p:cNvPr id="6" name="Rounded Rectangle 5"/>
+            <p:cNvSpPr/>
+            <p:nvPr/>
+          </p:nvSpPr>
+          <p:spPr>
+            <a:xfrm>
+              <a:off x="9681" y="6075"/>
+              <a:ext cx="3114" cy="751"/>
+            </a:xfrm>
+            <a:prstGeom prst="roundRect">
+              <a:avLst>
+                <a:gd name="adj" fmla="val 3056"/>
+              </a:avLst>
+            </a:prstGeom>
+            <a:noFill/>
+            <a:ln w="28575" cmpd="sng">
+              <a:solidFill>
+                <a:schemeClr val="tx1"/>
+              </a:solidFill>
+              <a:prstDash val="solid"/>
+            </a:ln>
+          </p:spPr>
+          <p:style>
+            <a:lnRef idx="2">
+              <a:schemeClr val="accent1">
+                <a:lumMod val="75000"/>
+              </a:schemeClr>
+            </a:lnRef>
+            <a:fillRef idx="1">
+              <a:schemeClr val="accent1"/>
+            </a:fillRef>
+            <a:effectRef idx="0">
+              <a:srgbClr val="FFFFFF"/>
+            </a:effectRef>
+            <a:fontRef idx="minor">
+              <a:schemeClr val="lt1"/>
+            </a:fontRef>
+          </p:style>
+          <p:txBody>
+            <a:bodyPr rtlCol="0" anchor="ctr"/>
+            <a:p>
+              <a:pPr algn="ctr"/>
+              <a:r>
+                <a:rPr lang="en-US" sz="1200">
+                  <a:solidFill>
+                    <a:schemeClr val="tx1"/>
+                  </a:solidFill>
+                </a:rPr>
+                <a:t>User Data Model</a:t>
+              </a:r>
+              <a:endParaRPr lang="en-US" sz="1200">
+                <a:solidFill>
+                  <a:schemeClr val="tx1"/>
+                </a:solidFill>
+              </a:endParaRPr>
+            </a:p>
+          </p:txBody>
+        </p:sp>
+        <p:sp>
+          <p:nvSpPr>
+            <p:cNvPr id="11" name="Rounded Rectangle 10"/>
+            <p:cNvSpPr/>
+            <p:nvPr/>
+          </p:nvSpPr>
+          <p:spPr>
+            <a:xfrm>
+              <a:off x="9681" y="7055"/>
+              <a:ext cx="3114" cy="751"/>
+            </a:xfrm>
+            <a:prstGeom prst="roundRect">
+              <a:avLst>
+                <a:gd name="adj" fmla="val 3056"/>
+              </a:avLst>
+            </a:prstGeom>
+            <a:noFill/>
+            <a:ln w="28575" cmpd="sng">
+              <a:solidFill>
+                <a:schemeClr val="tx1"/>
+              </a:solidFill>
+              <a:prstDash val="solid"/>
+            </a:ln>
+          </p:spPr>
+          <p:style>
+            <a:lnRef idx="2">
+              <a:schemeClr val="accent1">
+                <a:lumMod val="75000"/>
+              </a:schemeClr>
+            </a:lnRef>
+            <a:fillRef idx="1">
+              <a:schemeClr val="accent1"/>
+            </a:fillRef>
+            <a:effectRef idx="0">
+              <a:srgbClr val="FFFFFF"/>
+            </a:effectRef>
+            <a:fontRef idx="minor">
+              <a:schemeClr val="lt1"/>
+            </a:fontRef>
+          </p:style>
+          <p:txBody>
+            <a:bodyPr rtlCol="0" anchor="ctr"/>
+            <a:p>
+              <a:pPr algn="ctr"/>
+              <a:r>
+                <a:rPr lang="en-US" sz="1200">
+                  <a:solidFill>
+                    <a:schemeClr val="tx1"/>
+                  </a:solidFill>
+                </a:rPr>
+                <a:t>Account Validation</a:t>
+              </a:r>
+              <a:endParaRPr lang="en-US" sz="1200">
+                <a:solidFill>
+                  <a:schemeClr val="tx1"/>
+                </a:solidFill>
+              </a:endParaRPr>
+            </a:p>
+          </p:txBody>
+        </p:sp>
+        <p:sp>
+          <p:nvSpPr>
+            <p:cNvPr id="51" name="Rounded Rectangle 50"/>
+            <p:cNvSpPr/>
+            <p:nvPr/>
+          </p:nvSpPr>
+          <p:spPr>
+            <a:xfrm>
+              <a:off x="10349" y="1957"/>
+              <a:ext cx="3114" cy="751"/>
+            </a:xfrm>
+            <a:prstGeom prst="roundRect">
+              <a:avLst>
+                <a:gd name="adj" fmla="val 3056"/>
+              </a:avLst>
+            </a:prstGeom>
+            <a:noFill/>
+            <a:ln w="28575" cmpd="sng">
+              <a:solidFill>
+                <a:schemeClr val="tx1"/>
+              </a:solidFill>
+              <a:prstDash val="solid"/>
+            </a:ln>
+          </p:spPr>
+          <p:style>
+            <a:lnRef idx="2">
+              <a:schemeClr val="accent1">
+                <a:lumMod val="75000"/>
+              </a:schemeClr>
+            </a:lnRef>
+            <a:fillRef idx="1">
+              <a:schemeClr val="accent1"/>
+            </a:fillRef>
+            <a:effectRef idx="0">
+              <a:srgbClr val="FFFFFF"/>
+            </a:effectRef>
+            <a:fontRef idx="minor">
+              <a:schemeClr val="lt1"/>
+            </a:fontRef>
+          </p:style>
+          <p:txBody>
+            <a:bodyPr rtlCol="0" anchor="ctr"/>
+            <a:p>
+              <a:pPr algn="ctr"/>
+              <a:r>
+                <a:rPr lang="en-US" sz="1200">
+                  <a:solidFill>
+                    <a:schemeClr val="tx1"/>
+                  </a:solidFill>
+                </a:rPr>
+                <a:t>Account Controller</a:t>
+              </a:r>
+              <a:endParaRPr lang="en-US" sz="1200">
+                <a:solidFill>
+                  <a:schemeClr val="tx1"/>
+                </a:solidFill>
+              </a:endParaRPr>
+            </a:p>
+          </p:txBody>
+        </p:sp>
+        <p:sp>
+          <p:nvSpPr>
+            <p:cNvPr id="52" name="Rounded Rectangle 51"/>
+            <p:cNvSpPr/>
+            <p:nvPr/>
+          </p:nvSpPr>
+          <p:spPr>
+            <a:xfrm>
+              <a:off x="10349" y="2935"/>
+              <a:ext cx="3114" cy="751"/>
+            </a:xfrm>
+            <a:prstGeom prst="roundRect">
+              <a:avLst>
+                <a:gd name="adj" fmla="val 3056"/>
+              </a:avLst>
+            </a:prstGeom>
+            <a:noFill/>
+            <a:ln w="28575" cmpd="sng">
+              <a:solidFill>
+                <a:schemeClr val="tx1"/>
+              </a:solidFill>
+              <a:prstDash val="solid"/>
+            </a:ln>
+          </p:spPr>
+          <p:style>
+            <a:lnRef idx="2">
+              <a:schemeClr val="accent1">
+                <a:lumMod val="75000"/>
+              </a:schemeClr>
+            </a:lnRef>
+            <a:fillRef idx="1">
+              <a:schemeClr val="accent1"/>
+            </a:fillRef>
+            <a:effectRef idx="0">
+              <a:srgbClr val="FFFFFF"/>
+            </a:effectRef>
+            <a:fontRef idx="minor">
+              <a:schemeClr val="lt1"/>
+            </a:fontRef>
+          </p:style>
+          <p:txBody>
+            <a:bodyPr rtlCol="0" anchor="ctr"/>
+            <a:p>
+              <a:pPr algn="ctr"/>
+              <a:r>
+                <a:rPr lang="en-US" sz="1200">
+                  <a:solidFill>
+                    <a:schemeClr val="tx1"/>
+                  </a:solidFill>
+                </a:rPr>
+                <a:t>Search Controller</a:t>
+              </a:r>
+              <a:endParaRPr lang="en-US" sz="1200">
+                <a:solidFill>
+                  <a:schemeClr val="tx1"/>
+                </a:solidFill>
+              </a:endParaRPr>
+            </a:p>
+          </p:txBody>
+        </p:sp>
+        <p:sp>
+          <p:nvSpPr>
+            <p:cNvPr id="53" name="Rounded Rectangle 52"/>
+            <p:cNvSpPr/>
+            <p:nvPr/>
+          </p:nvSpPr>
+          <p:spPr>
+            <a:xfrm>
+              <a:off x="13661" y="1955"/>
+              <a:ext cx="3114" cy="751"/>
+            </a:xfrm>
+            <a:prstGeom prst="roundRect">
+              <a:avLst>
+                <a:gd name="adj" fmla="val 3056"/>
+              </a:avLst>
+            </a:prstGeom>
+            <a:noFill/>
+            <a:ln w="28575" cmpd="sng">
+              <a:solidFill>
+                <a:schemeClr val="tx1"/>
+              </a:solidFill>
+              <a:prstDash val="solid"/>
+            </a:ln>
+          </p:spPr>
+          <p:style>
+            <a:lnRef idx="2">
+              <a:schemeClr val="accent1">
+                <a:lumMod val="75000"/>
+              </a:schemeClr>
+            </a:lnRef>
+            <a:fillRef idx="1">
+              <a:schemeClr val="accent1"/>
+            </a:fillRef>
+            <a:effectRef idx="0">
+              <a:srgbClr val="FFFFFF"/>
+            </a:effectRef>
+            <a:fontRef idx="minor">
+              <a:schemeClr val="lt1"/>
+            </a:fontRef>
+          </p:style>
+          <p:txBody>
+            <a:bodyPr rtlCol="0" anchor="ctr"/>
+            <a:p>
+              <a:pPr algn="ctr"/>
+              <a:r>
+                <a:rPr lang="en-US" sz="1200">
+                  <a:solidFill>
+                    <a:schemeClr val="tx1"/>
+                  </a:solidFill>
+                </a:rPr>
+                <a:t>Moment Controller</a:t>
+              </a:r>
+              <a:endParaRPr lang="en-US" sz="1200">
+                <a:solidFill>
+                  <a:schemeClr val="tx1"/>
+                </a:solidFill>
+              </a:endParaRPr>
+            </a:p>
+          </p:txBody>
+        </p:sp>
+        <p:sp>
+          <p:nvSpPr>
+            <p:cNvPr id="54" name="Rounded Rectangle 53"/>
+            <p:cNvSpPr/>
+            <p:nvPr/>
+          </p:nvSpPr>
+          <p:spPr>
+            <a:xfrm>
+              <a:off x="13661" y="2935"/>
+              <a:ext cx="3114" cy="751"/>
+            </a:xfrm>
+            <a:prstGeom prst="roundRect">
+              <a:avLst>
+                <a:gd name="adj" fmla="val 3056"/>
+              </a:avLst>
+            </a:prstGeom>
+            <a:noFill/>
+            <a:ln w="28575" cmpd="sng">
+              <a:solidFill>
+                <a:schemeClr val="tx1"/>
+              </a:solidFill>
+              <a:prstDash val="solid"/>
+            </a:ln>
+          </p:spPr>
+          <p:style>
+            <a:lnRef idx="2">
+              <a:schemeClr val="accent1">
+                <a:lumMod val="75000"/>
+              </a:schemeClr>
+            </a:lnRef>
+            <a:fillRef idx="1">
+              <a:schemeClr val="accent1"/>
+            </a:fillRef>
+            <a:effectRef idx="0">
+              <a:srgbClr val="FFFFFF"/>
+            </a:effectRef>
+            <a:fontRef idx="minor">
+              <a:schemeClr val="lt1"/>
+            </a:fontRef>
+          </p:style>
+          <p:txBody>
+            <a:bodyPr rtlCol="0" anchor="ctr"/>
+            <a:p>
+              <a:pPr algn="ctr"/>
+              <a:r>
+                <a:rPr lang="en-US" sz="1200">
+                  <a:solidFill>
+                    <a:schemeClr val="tx1"/>
+                  </a:solidFill>
+                </a:rPr>
+                <a:t>Diagram Display Controller</a:t>
+              </a:r>
+              <a:endParaRPr lang="en-US" sz="1200">
+                <a:solidFill>
+                  <a:schemeClr val="tx1"/>
+                </a:solidFill>
+              </a:endParaRPr>
+            </a:p>
+          </p:txBody>
+        </p:sp>
+        <p:sp>
+          <p:nvSpPr>
+            <p:cNvPr id="55" name="Rounded Rectangle 54"/>
+            <p:cNvSpPr/>
+            <p:nvPr/>
+          </p:nvSpPr>
+          <p:spPr>
+            <a:xfrm>
+              <a:off x="2189" y="1959"/>
+              <a:ext cx="3114" cy="751"/>
+            </a:xfrm>
+            <a:prstGeom prst="roundRect">
+              <a:avLst>
+                <a:gd name="adj" fmla="val 3056"/>
+              </a:avLst>
+            </a:prstGeom>
+            <a:noFill/>
+            <a:ln w="28575" cmpd="sng">
+              <a:solidFill>
+                <a:schemeClr val="tx1"/>
+              </a:solidFill>
+              <a:prstDash val="solid"/>
+            </a:ln>
+          </p:spPr>
+          <p:style>
+            <a:lnRef idx="2">
+              <a:schemeClr val="accent1">
+                <a:lumMod val="75000"/>
+              </a:schemeClr>
+            </a:lnRef>
+            <a:fillRef idx="1">
+              <a:schemeClr val="accent1"/>
+            </a:fillRef>
+            <a:effectRef idx="0">
+              <a:srgbClr val="FFFFFF"/>
+            </a:effectRef>
+            <a:fontRef idx="minor">
+              <a:schemeClr val="lt1"/>
+            </a:fontRef>
+          </p:style>
+          <p:txBody>
+            <a:bodyPr rtlCol="0" anchor="ctr"/>
+            <a:p>
+              <a:pPr algn="ctr"/>
+              <a:r>
+                <a:rPr lang="en-US" sz="1200">
+                  <a:solidFill>
+                    <a:schemeClr val="tx1"/>
+                  </a:solidFill>
+                </a:rPr>
+                <a:t>Account User Interface</a:t>
+              </a:r>
+              <a:endParaRPr lang="en-US" sz="1200">
+                <a:solidFill>
+                  <a:schemeClr val="tx1"/>
+                </a:solidFill>
+              </a:endParaRPr>
+            </a:p>
+          </p:txBody>
+        </p:sp>
+        <p:sp>
+          <p:nvSpPr>
+            <p:cNvPr id="56" name="Rounded Rectangle 55"/>
+            <p:cNvSpPr/>
+            <p:nvPr/>
+          </p:nvSpPr>
+          <p:spPr>
+            <a:xfrm>
+              <a:off x="2189" y="2937"/>
+              <a:ext cx="3114" cy="751"/>
+            </a:xfrm>
+            <a:prstGeom prst="roundRect">
+              <a:avLst>
+                <a:gd name="adj" fmla="val 3056"/>
+              </a:avLst>
+            </a:prstGeom>
+            <a:noFill/>
+            <a:ln w="28575" cmpd="sng">
+              <a:solidFill>
+                <a:schemeClr val="tx1"/>
+              </a:solidFill>
+              <a:prstDash val="solid"/>
+            </a:ln>
+          </p:spPr>
+          <p:style>
+            <a:lnRef idx="2">
+              <a:schemeClr val="accent1">
+                <a:lumMod val="75000"/>
+              </a:schemeClr>
+            </a:lnRef>
+            <a:fillRef idx="1">
+              <a:schemeClr val="accent1"/>
+            </a:fillRef>
+            <a:effectRef idx="0">
+              <a:srgbClr val="FFFFFF"/>
+            </a:effectRef>
+            <a:fontRef idx="minor">
+              <a:schemeClr val="lt1"/>
+            </a:fontRef>
+          </p:style>
+          <p:txBody>
+            <a:bodyPr rtlCol="0" anchor="ctr"/>
+            <a:p>
+              <a:pPr algn="ctr"/>
+              <a:r>
+                <a:rPr lang="en-US" sz="1200">
+                  <a:solidFill>
+                    <a:schemeClr val="tx1"/>
+                  </a:solidFill>
+                </a:rPr>
+                <a:t>Data Analysis User Interface</a:t>
+              </a:r>
+              <a:endParaRPr lang="en-US" sz="1200">
+                <a:solidFill>
+                  <a:schemeClr val="tx1"/>
+                </a:solidFill>
+              </a:endParaRPr>
+            </a:p>
+          </p:txBody>
+        </p:sp>
+        <p:sp>
+          <p:nvSpPr>
+            <p:cNvPr id="57" name="Rounded Rectangle 56"/>
+            <p:cNvSpPr/>
+            <p:nvPr/>
+          </p:nvSpPr>
+          <p:spPr>
+            <a:xfrm>
+              <a:off x="5501" y="1957"/>
+              <a:ext cx="3114" cy="751"/>
+            </a:xfrm>
+            <a:prstGeom prst="roundRect">
+              <a:avLst>
+                <a:gd name="adj" fmla="val 3056"/>
+              </a:avLst>
+            </a:prstGeom>
+            <a:noFill/>
+            <a:ln w="28575" cmpd="sng">
+              <a:solidFill>
+                <a:schemeClr val="tx1"/>
+              </a:solidFill>
+              <a:prstDash val="solid"/>
+            </a:ln>
+          </p:spPr>
+          <p:style>
+            <a:lnRef idx="2">
+              <a:schemeClr val="accent1">
+                <a:lumMod val="75000"/>
+              </a:schemeClr>
+            </a:lnRef>
+            <a:fillRef idx="1">
+              <a:schemeClr val="accent1"/>
+            </a:fillRef>
+            <a:effectRef idx="0">
+              <a:srgbClr val="FFFFFF"/>
+            </a:effectRef>
+            <a:fontRef idx="minor">
+              <a:schemeClr val="lt1"/>
+            </a:fontRef>
+          </p:style>
+          <p:txBody>
+            <a:bodyPr rtlCol="0" anchor="ctr"/>
+            <a:p>
+              <a:pPr algn="ctr"/>
+              <a:r>
+                <a:rPr lang="en-US" sz="1200">
+                  <a:solidFill>
+                    <a:schemeClr val="tx1"/>
+                  </a:solidFill>
+                </a:rPr>
+                <a:t>Search User Interface</a:t>
+              </a:r>
+              <a:endParaRPr lang="en-US" sz="1200">
+                <a:solidFill>
+                  <a:schemeClr val="tx1"/>
+                </a:solidFill>
+              </a:endParaRPr>
+            </a:p>
+          </p:txBody>
+        </p:sp>
+        <p:sp>
+          <p:nvSpPr>
+            <p:cNvPr id="58" name="Rounded Rectangle 57"/>
+            <p:cNvSpPr/>
+            <p:nvPr/>
+          </p:nvSpPr>
+          <p:spPr>
+            <a:xfrm>
+              <a:off x="5501" y="2937"/>
+              <a:ext cx="3114" cy="751"/>
+            </a:xfrm>
+            <a:prstGeom prst="roundRect">
+              <a:avLst>
+                <a:gd name="adj" fmla="val 3056"/>
+              </a:avLst>
+            </a:prstGeom>
+            <a:noFill/>
+            <a:ln w="28575" cmpd="sng">
+              <a:solidFill>
+                <a:schemeClr val="tx1"/>
+              </a:solidFill>
+              <a:prstDash val="solid"/>
+            </a:ln>
+          </p:spPr>
+          <p:style>
+            <a:lnRef idx="2">
+              <a:schemeClr val="accent1">
+                <a:lumMod val="75000"/>
+              </a:schemeClr>
+            </a:lnRef>
+            <a:fillRef idx="1">
+              <a:schemeClr val="accent1"/>
+            </a:fillRef>
+            <a:effectRef idx="0">
+              <a:srgbClr val="FFFFFF"/>
+            </a:effectRef>
+            <a:fontRef idx="minor">
+              <a:schemeClr val="lt1"/>
+            </a:fontRef>
+          </p:style>
+          <p:txBody>
+            <a:bodyPr rtlCol="0" anchor="ctr"/>
+            <a:p>
+              <a:pPr algn="ctr"/>
+              <a:r>
+                <a:rPr lang="en-US" sz="1200">
+                  <a:solidFill>
+                    <a:schemeClr val="tx1"/>
+                  </a:solidFill>
+                </a:rPr>
+                <a:t>Moment User Interface</a:t>
+              </a:r>
+              <a:endParaRPr lang="en-US" sz="1200">
+                <a:solidFill>
+                  <a:schemeClr val="tx1"/>
+                </a:solidFill>
+              </a:endParaRPr>
+            </a:p>
+          </p:txBody>
+        </p:sp>
+        <p:sp>
+          <p:nvSpPr>
+            <p:cNvPr id="60" name="Right Arrow 59"/>
+            <p:cNvSpPr/>
+            <p:nvPr/>
+          </p:nvSpPr>
+          <p:spPr>
+            <a:xfrm rot="14580000">
+              <a:off x="5975" y="4570"/>
+              <a:ext cx="1285" cy="225"/>
+            </a:xfrm>
+            <a:prstGeom prst="rightArrow">
+              <a:avLst>
+                <a:gd name="adj1" fmla="val 50000"/>
+                <a:gd name="adj2" fmla="val 100000"/>
+              </a:avLst>
+            </a:prstGeom>
+            <a:solidFill>
+              <a:schemeClr val="tx1"/>
+            </a:solidFill>
+            <a:ln>
+              <a:solidFill>
+                <a:schemeClr val="tx1"/>
+              </a:solidFill>
+            </a:ln>
+          </p:spPr>
+          <p:style>
+            <a:lnRef idx="2">
+              <a:schemeClr val="accent1">
+                <a:lumMod val="75000"/>
+              </a:schemeClr>
+            </a:lnRef>
+            <a:fillRef idx="1">
+              <a:schemeClr val="accent1"/>
+            </a:fillRef>
+            <a:effectRef idx="0">
+              <a:srgbClr val="FFFFFF"/>
+            </a:effectRef>
+            <a:fontRef idx="minor">
+              <a:schemeClr val="lt1"/>
+            </a:fontRef>
+          </p:style>
+          <p:txBody>
+            <a:bodyPr rtlCol="0" anchor="ctr"/>
+            <a:p>
+              <a:pPr algn="ctr"/>
+              <a:endParaRPr lang="en-US"/>
+            </a:p>
+          </p:txBody>
+        </p:sp>
+        <p:sp>
+          <p:nvSpPr>
+            <p:cNvPr id="62" name="Right Arrow 61"/>
+            <p:cNvSpPr/>
+            <p:nvPr/>
+          </p:nvSpPr>
+          <p:spPr>
+            <a:xfrm rot="7140000">
+              <a:off x="11955" y="4562"/>
+              <a:ext cx="1285" cy="225"/>
+            </a:xfrm>
+            <a:prstGeom prst="rightArrow">
+              <a:avLst>
+                <a:gd name="adj1" fmla="val 50000"/>
+                <a:gd name="adj2" fmla="val 100000"/>
+              </a:avLst>
+            </a:prstGeom>
+            <a:solidFill>
+              <a:schemeClr val="tx1"/>
+            </a:solidFill>
+            <a:ln>
+              <a:solidFill>
+                <a:schemeClr val="tx1"/>
+              </a:solidFill>
+            </a:ln>
+          </p:spPr>
+          <p:style>
+            <a:lnRef idx="2">
+              <a:schemeClr val="accent1">
+                <a:lumMod val="75000"/>
+              </a:schemeClr>
+            </a:lnRef>
+            <a:fillRef idx="1">
+              <a:schemeClr val="accent1"/>
+            </a:fillRef>
+            <a:effectRef idx="0">
+              <a:srgbClr val="FFFFFF"/>
+            </a:effectRef>
+            <a:fontRef idx="minor">
+              <a:schemeClr val="lt1"/>
+            </a:fontRef>
+          </p:style>
+          <p:txBody>
+            <a:bodyPr rtlCol="0" anchor="ctr"/>
+            <a:p>
+              <a:pPr algn="ctr"/>
+              <a:endParaRPr lang="en-US"/>
+            </a:p>
+          </p:txBody>
+        </p:sp>
+        <p:sp>
+          <p:nvSpPr>
+            <p:cNvPr id="63" name="Text Box 62"/>
+            <p:cNvSpPr txBox="1"/>
+            <p:nvPr/>
+          </p:nvSpPr>
+          <p:spPr>
+            <a:xfrm>
+              <a:off x="8884" y="2227"/>
+              <a:ext cx="1164" cy="408"/>
+            </a:xfrm>
+            <a:prstGeom prst="rect">
+              <a:avLst/>
+            </a:prstGeom>
+            <a:noFill/>
+          </p:spPr>
+          <p:txBody>
+            <a:bodyPr wrap="square" rtlCol="0">
+              <a:spAutoFit/>
+            </a:bodyPr>
+            <a:p>
+              <a:pPr algn="ctr"/>
+              <a:r>
+                <a:rPr lang="en-US" sz="1400" b="1"/>
+                <a:t>Update</a:t>
+              </a:r>
+              <a:endParaRPr lang="en-US" sz="1400" b="1"/>
+            </a:p>
+          </p:txBody>
+        </p:sp>
+        <p:sp>
+          <p:nvSpPr>
+            <p:cNvPr id="64" name="Text Box 63"/>
+            <p:cNvSpPr txBox="1"/>
+            <p:nvPr/>
+          </p:nvSpPr>
+          <p:spPr>
+            <a:xfrm>
+              <a:off x="8884" y="2937"/>
+              <a:ext cx="1164" cy="694"/>
+            </a:xfrm>
+            <a:prstGeom prst="rect">
+              <a:avLst/>
+            </a:prstGeom>
+            <a:noFill/>
+          </p:spPr>
+          <p:txBody>
+            <a:bodyPr wrap="square" rtlCol="0">
+              <a:spAutoFit/>
+            </a:bodyPr>
+            <a:p>
+              <a:pPr algn="ctr"/>
+              <a:r>
+                <a:rPr lang="en-US" sz="1400" b="1"/>
+                <a:t>Send Input</a:t>
+              </a:r>
+              <a:endParaRPr lang="en-US" sz="1400" b="1"/>
+            </a:p>
+          </p:txBody>
+        </p:sp>
+        <p:sp>
+          <p:nvSpPr>
+            <p:cNvPr id="65" name="Text Box 64"/>
+            <p:cNvSpPr txBox="1"/>
+            <p:nvPr/>
+          </p:nvSpPr>
+          <p:spPr>
+            <a:xfrm>
+              <a:off x="5303" y="4563"/>
+              <a:ext cx="1164" cy="408"/>
+            </a:xfrm>
+            <a:prstGeom prst="rect">
+              <a:avLst/>
+            </a:prstGeom>
+            <a:noFill/>
+          </p:spPr>
+          <p:txBody>
+            <a:bodyPr wrap="square" rtlCol="0">
+              <a:spAutoFit/>
+            </a:bodyPr>
+            <a:p>
+              <a:pPr algn="ctr"/>
+              <a:r>
+                <a:rPr lang="en-US" sz="1400" b="1"/>
+                <a:t>Update</a:t>
+              </a:r>
+              <a:endParaRPr lang="en-US" sz="1400" b="1"/>
+            </a:p>
+          </p:txBody>
+        </p:sp>
+        <p:sp>
+          <p:nvSpPr>
+            <p:cNvPr id="66" name="Text Box 65"/>
+            <p:cNvSpPr txBox="1"/>
+            <p:nvPr/>
+          </p:nvSpPr>
+          <p:spPr>
+            <a:xfrm>
+              <a:off x="12795" y="4563"/>
+              <a:ext cx="2123" cy="408"/>
+            </a:xfrm>
+            <a:prstGeom prst="rect">
+              <a:avLst/>
+            </a:prstGeom>
+            <a:noFill/>
+          </p:spPr>
+          <p:txBody>
+            <a:bodyPr wrap="square" rtlCol="0">
+              <a:spAutoFit/>
+            </a:bodyPr>
+            <a:p>
+              <a:pPr algn="ctr"/>
+              <a:r>
+                <a:rPr lang="en-US" sz="1400" b="1"/>
+                <a:t>Manipulate</a:t>
+              </a:r>
+              <a:endParaRPr lang="en-US" sz="1400" b="1"/>
+            </a:p>
+          </p:txBody>
+        </p:sp>
+      </p:grpSp>
+    </p:spTree>
+  </p:cSld>
+  <p:clrMapOvr>
+    <a:masterClrMapping/>
+  </p:clrMapOvr>
+</p:sld>
+</file>
+
 <file path=ppt/theme/theme1.xml><?xml version="1.0" encoding="utf-8"?>
 <a:theme xmlns:a="http://schemas.openxmlformats.org/drawingml/2006/main" name="Office Theme">
   <a:themeElements>
@@ -8002,4 +9755,263 @@
     </a:ext>
   </a:extLst>
 </a:theme>
+</file>
+
+<file path=ppt/theme/theme2.xml><?xml version="1.0" encoding="utf-8"?>
+<a:theme xmlns:a="http://schemas.openxmlformats.org/drawingml/2006/main" name="Office Theme">
+  <a:themeElements>
+    <a:clrScheme name="Office">
+      <a:dk1>
+        <a:sysClr val="windowText" lastClr="000000"/>
+      </a:dk1>
+      <a:lt1>
+        <a:sysClr val="window" lastClr="FFFFFF"/>
+      </a:lt1>
+      <a:dk2>
+        <a:srgbClr val="44546A"/>
+      </a:dk2>
+      <a:lt2>
+        <a:srgbClr val="E7E6E6"/>
+      </a:lt2>
+      <a:accent1>
+        <a:srgbClr val="5B9BD5"/>
+      </a:accent1>
+      <a:accent2>
+        <a:srgbClr val="ED7D31"/>
+      </a:accent2>
+      <a:accent3>
+        <a:srgbClr val="A5A5A5"/>
+      </a:accent3>
+      <a:accent4>
+        <a:srgbClr val="FFC000"/>
+      </a:accent4>
+      <a:accent5>
+        <a:srgbClr val="4472C4"/>
+      </a:accent5>
+      <a:accent6>
+        <a:srgbClr val="70AD47"/>
+      </a:accent6>
+      <a:hlink>
+        <a:srgbClr val="0563C1"/>
+      </a:hlink>
+      <a:folHlink>
+        <a:srgbClr val="954F72"/>
+      </a:folHlink>
+    </a:clrScheme>
+    <a:fontScheme name="Office">
+      <a:majorFont>
+        <a:latin typeface="Calibri Light"/>
+        <a:ea typeface=""/>
+        <a:cs typeface=""/>
+        <a:font script="Jpan" typeface="ＭＳ Ｐゴシック"/>
+        <a:font script="Hang" typeface="맑은 고딕"/>
+        <a:font script="Hans" typeface="宋体"/>
+        <a:font script="Hant" typeface="新細明體"/>
+        <a:font script="Arab" typeface="Times New Roman"/>
+        <a:font script="Hebr" typeface="Times New Roman"/>
+        <a:font script="Thai" typeface="Angsana New"/>
+        <a:font script="Ethi" typeface="Nyala"/>
+        <a:font script="Beng" typeface="Vrinda"/>
+        <a:font script="Gujr" typeface="Shruti"/>
+        <a:font script="Khmr" typeface="MoolBoran"/>
+        <a:font script="Knda" typeface="Tunga"/>
+        <a:font script="Guru" typeface="Raavi"/>
+        <a:font script="Cans" typeface="Euphemia"/>
+        <a:font script="Cher" typeface="Plantagenet Cherokee"/>
+        <a:font script="Yiii" typeface="Microsoft Yi Baiti"/>
+        <a:font script="Tibt" typeface="Microsoft Himalaya"/>
+        <a:font script="Thaa" typeface="MV Boli"/>
+        <a:font script="Deva" typeface="Mangal"/>
+        <a:font script="Telu" typeface="Gautami"/>
+        <a:font script="Taml" typeface="Latha"/>
+        <a:font script="Syrc" typeface="Estrangelo Edessa"/>
+        <a:font script="Orya" typeface="Kalinga"/>
+        <a:font script="Mlym" typeface="Kartika"/>
+        <a:font script="Laoo" typeface="DokChampa"/>
+        <a:font script="Sinh" typeface="Iskoola Pota"/>
+        <a:font script="Mong" typeface="Mongolian Baiti"/>
+        <a:font script="Viet" typeface="Times New Roman"/>
+        <a:font script="Uigh" typeface="Microsoft Uighur"/>
+        <a:font script="Geor" typeface="Sylfaen"/>
+      </a:majorFont>
+      <a:minorFont>
+        <a:latin typeface="Calibri"/>
+        <a:ea typeface=""/>
+        <a:cs typeface=""/>
+        <a:font script="Jpan" typeface="ＭＳ Ｐゴシック"/>
+        <a:font script="Hang" typeface="맑은 고딕"/>
+        <a:font script="Hans" typeface="宋体"/>
+        <a:font script="Hant" typeface="新細明體"/>
+        <a:font script="Arab" typeface="Arial"/>
+        <a:font script="Hebr" typeface="Arial"/>
+        <a:font script="Thai" typeface="Cordia New"/>
+        <a:font script="Ethi" typeface="Nyala"/>
+        <a:font script="Beng" typeface="Vrinda"/>
+        <a:font script="Gujr" typeface="Shruti"/>
+        <a:font script="Khmr" typeface="DaunPenh"/>
+        <a:font script="Knda" typeface="Tunga"/>
+        <a:font script="Guru" typeface="Raavi"/>
+        <a:font script="Cans" typeface="Euphemia"/>
+        <a:font script="Cher" typeface="Plantagenet Cherokee"/>
+        <a:font script="Yiii" typeface="Microsoft Yi Baiti"/>
+        <a:font script="Tibt" typeface="Microsoft Himalaya"/>
+        <a:font script="Thaa" typeface="MV Boli"/>
+        <a:font script="Deva" typeface="Mangal"/>
+        <a:font script="Telu" typeface="Gautami"/>
+        <a:font script="Taml" typeface="Latha"/>
+        <a:font script="Syrc" typeface="Estrangelo Edessa"/>
+        <a:font script="Orya" typeface="Kalinga"/>
+        <a:font script="Mlym" typeface="Kartika"/>
+        <a:font script="Laoo" typeface="DokChampa"/>
+        <a:font script="Sinh" typeface="Iskoola Pota"/>
+        <a:font script="Mong" typeface="Mongolian Baiti"/>
+        <a:font script="Viet" typeface="Arial"/>
+        <a:font script="Uigh" typeface="Microsoft Uighur"/>
+        <a:font script="Geor" typeface="Sylfaen"/>
+      </a:minorFont>
+    </a:fontScheme>
+    <a:fmtScheme name="Office">
+      <a:fillStyleLst>
+        <a:solidFill>
+          <a:schemeClr val="phClr"/>
+        </a:solidFill>
+        <a:gradFill rotWithShape="1">
+          <a:gsLst>
+            <a:gs pos="0">
+              <a:schemeClr val="phClr">
+                <a:lumMod val="110000"/>
+                <a:satMod val="105000"/>
+                <a:tint val="67000"/>
+              </a:schemeClr>
+            </a:gs>
+            <a:gs pos="50000">
+              <a:schemeClr val="phClr">
+                <a:lumMod val="105000"/>
+                <a:satMod val="103000"/>
+                <a:tint val="73000"/>
+              </a:schemeClr>
+            </a:gs>
+            <a:gs pos="100000">
+              <a:schemeClr val="phClr">
+                <a:lumMod val="105000"/>
+                <a:satMod val="109000"/>
+                <a:tint val="81000"/>
+              </a:schemeClr>
+            </a:gs>
+          </a:gsLst>
+          <a:lin ang="5400000" scaled="0"/>
+        </a:gradFill>
+        <a:gradFill rotWithShape="1">
+          <a:gsLst>
+            <a:gs pos="0">
+              <a:schemeClr val="phClr">
+                <a:satMod val="103000"/>
+                <a:lumMod val="102000"/>
+                <a:tint val="94000"/>
+              </a:schemeClr>
+            </a:gs>
+            <a:gs pos="50000">
+              <a:schemeClr val="phClr">
+                <a:satMod val="110000"/>
+                <a:lumMod val="100000"/>
+                <a:shade val="100000"/>
+              </a:schemeClr>
+            </a:gs>
+            <a:gs pos="100000">
+              <a:schemeClr val="phClr">
+                <a:lumMod val="99000"/>
+                <a:satMod val="120000"/>
+                <a:shade val="78000"/>
+              </a:schemeClr>
+            </a:gs>
+          </a:gsLst>
+          <a:lin ang="5400000" scaled="0"/>
+        </a:gradFill>
+      </a:fillStyleLst>
+      <a:lnStyleLst>
+        <a:ln w="6350" cap="flat" cmpd="sng" algn="ctr">
+          <a:solidFill>
+            <a:schemeClr val="phClr"/>
+          </a:solidFill>
+          <a:prstDash val="solid"/>
+          <a:miter lim="800000"/>
+        </a:ln>
+        <a:ln w="12700" cap="flat" cmpd="sng" algn="ctr">
+          <a:solidFill>
+            <a:schemeClr val="phClr"/>
+          </a:solidFill>
+          <a:prstDash val="solid"/>
+          <a:miter lim="800000"/>
+        </a:ln>
+        <a:ln w="19050" cap="flat" cmpd="sng" algn="ctr">
+          <a:solidFill>
+            <a:schemeClr val="phClr"/>
+          </a:solidFill>
+          <a:prstDash val="solid"/>
+          <a:miter lim="800000"/>
+        </a:ln>
+      </a:lnStyleLst>
+      <a:effectStyleLst>
+        <a:effectStyle>
+          <a:effectLst/>
+        </a:effectStyle>
+        <a:effectStyle>
+          <a:effectLst/>
+        </a:effectStyle>
+        <a:effectStyle>
+          <a:effectLst>
+            <a:outerShdw blurRad="57150" dist="19050" dir="5400000" algn="ctr" rotWithShape="0">
+              <a:srgbClr val="000000">
+                <a:alpha val="63000"/>
+              </a:srgbClr>
+            </a:outerShdw>
+          </a:effectLst>
+        </a:effectStyle>
+      </a:effectStyleLst>
+      <a:bgFillStyleLst>
+        <a:solidFill>
+          <a:schemeClr val="phClr"/>
+        </a:solidFill>
+        <a:solidFill>
+          <a:schemeClr val="phClr">
+            <a:tint val="95000"/>
+            <a:satMod val="170000"/>
+          </a:schemeClr>
+        </a:solidFill>
+        <a:gradFill rotWithShape="1">
+          <a:gsLst>
+            <a:gs pos="0">
+              <a:schemeClr val="phClr">
+                <a:tint val="93000"/>
+                <a:satMod val="150000"/>
+                <a:shade val="98000"/>
+                <a:lumMod val="102000"/>
+              </a:schemeClr>
+            </a:gs>
+            <a:gs pos="50000">
+              <a:schemeClr val="phClr">
+                <a:tint val="98000"/>
+                <a:satMod val="130000"/>
+                <a:shade val="90000"/>
+                <a:lumMod val="103000"/>
+              </a:schemeClr>
+            </a:gs>
+            <a:gs pos="100000">
+              <a:schemeClr val="phClr">
+                <a:shade val="63000"/>
+                <a:satMod val="120000"/>
+              </a:schemeClr>
+            </a:gs>
+          </a:gsLst>
+          <a:lin ang="5400000" scaled="0"/>
+        </a:gradFill>
+      </a:bgFillStyleLst>
+    </a:fmtScheme>
+  </a:themeElements>
+  <a:extLst>
+    <a:ext uri="{05A4C25C-085E-4340-85A3-A5531E510DB2}">
+      <thm15:themeFamily xmlns:thm15="http://schemas.microsoft.com/office/thememl/2012/main" name="Office Theme" id="{62F939B6-93AF-4DB8-9C6B-D6C7DFDC589F}" vid="{4A3C46E8-61CC-4603-A589-7422A47A8E4A}"/>
+    </a:ext>
+  </a:extLst>
+</a:theme>
 </file>
</xml_diff>

<commit_message>
#0 update delivery3 in final version
</commit_message>
<xml_diff>
--- a/report_project/Delivery3/Report Graph.pptx
+++ b/report_project/Delivery3/Report Graph.pptx
@@ -7436,7 +7436,7 @@
         <p:spPr>
           <a:xfrm>
             <a:off x="830580" y="4868545"/>
-            <a:ext cx="1813560" cy="405130"/>
+            <a:ext cx="1447165" cy="405130"/>
           </a:xfrm>
           <a:prstGeom prst="roundRect">
             <a:avLst>
@@ -7495,8 +7495,8 @@
         </p:nvSpPr>
         <p:spPr>
           <a:xfrm>
-            <a:off x="2974975" y="4868545"/>
-            <a:ext cx="1813560" cy="405130"/>
+            <a:off x="2498090" y="4868545"/>
+            <a:ext cx="1447165" cy="405130"/>
           </a:xfrm>
           <a:prstGeom prst="roundRect">
             <a:avLst>
@@ -7555,8 +7555,8 @@
         </p:nvSpPr>
         <p:spPr>
           <a:xfrm>
-            <a:off x="5119370" y="4868545"/>
-            <a:ext cx="1813560" cy="405130"/>
+            <a:off x="4251960" y="4868545"/>
+            <a:ext cx="1447165" cy="405130"/>
           </a:xfrm>
           <a:prstGeom prst="roundRect">
             <a:avLst>
@@ -7615,8 +7615,8 @@
         </p:nvSpPr>
         <p:spPr>
           <a:xfrm>
-            <a:off x="7263765" y="4868545"/>
-            <a:ext cx="1813560" cy="405130"/>
+            <a:off x="5940425" y="4868545"/>
+            <a:ext cx="1447165" cy="405130"/>
           </a:xfrm>
           <a:prstGeom prst="roundRect">
             <a:avLst>
@@ -8129,6 +8129,66 @@
           <a:p>
             <a:pPr algn="ctr"/>
             <a:endParaRPr lang="en-US"/>
+          </a:p>
+        </p:txBody>
+      </p:sp>
+      <p:sp>
+        <p:nvSpPr>
+          <p:cNvPr id="2" name="Rounded Rectangle 1"/>
+          <p:cNvSpPr/>
+          <p:nvPr/>
+        </p:nvSpPr>
+        <p:spPr>
+          <a:xfrm>
+            <a:off x="7731760" y="4868545"/>
+            <a:ext cx="1447165" cy="405130"/>
+          </a:xfrm>
+          <a:prstGeom prst="roundRect">
+            <a:avLst>
+              <a:gd name="adj" fmla="val 3056"/>
+            </a:avLst>
+          </a:prstGeom>
+          <a:noFill/>
+          <a:ln w="28575" cmpd="sng">
+            <a:solidFill>
+              <a:schemeClr val="tx1"/>
+            </a:solidFill>
+            <a:prstDash val="solid"/>
+          </a:ln>
+        </p:spPr>
+        <p:style>
+          <a:lnRef idx="2">
+            <a:schemeClr val="accent1">
+              <a:lumMod val="75000"/>
+            </a:schemeClr>
+          </a:lnRef>
+          <a:fillRef idx="1">
+            <a:schemeClr val="accent1"/>
+          </a:fillRef>
+          <a:effectRef idx="0">
+            <a:srgbClr val="FFFFFF"/>
+          </a:effectRef>
+          <a:fontRef idx="minor">
+            <a:schemeClr val="lt1"/>
+          </a:fontRef>
+        </p:style>
+        <p:txBody>
+          <a:bodyPr rtlCol="0" anchor="ctr"/>
+          <a:p>
+            <a:pPr algn="ctr"/>
+            <a:r>
+              <a:rPr lang="en-US" sz="1200">
+                <a:solidFill>
+                  <a:schemeClr val="tx1"/>
+                </a:solidFill>
+              </a:rPr>
+              <a:t>Crawler</a:t>
+            </a:r>
+            <a:endParaRPr lang="en-US" sz="1200">
+              <a:solidFill>
+                <a:schemeClr val="tx1"/>
+              </a:solidFill>
+            </a:endParaRPr>
           </a:p>
         </p:txBody>
       </p:sp>
@@ -8779,7 +8839,7 @@
                     <a:schemeClr val="tx1"/>
                   </a:solidFill>
                 </a:rPr>
-                <a:t>Account Validation</a:t>
+                <a:t>Crawler</a:t>
               </a:r>
               <a:endParaRPr lang="en-US" sz="1200">
                 <a:solidFill>

</xml_diff>